<commit_message>
doubly linked list 코드 추가
</commit_message>
<xml_diff>
--- a/presentation/credit.pptx
+++ b/presentation/credit.pptx
@@ -34,6 +34,10 @@
     <p:sldId id="284" r:id="rId28"/>
     <p:sldId id="285" r:id="rId29"/>
     <p:sldId id="286" r:id="rId30"/>
+    <p:sldId id="287" r:id="rId31"/>
+    <p:sldId id="288" r:id="rId32"/>
+    <p:sldId id="289" r:id="rId33"/>
+    <p:sldId id="290" r:id="rId34"/>
   </p:sldIdLst>
   <p:sldSz cx="12192000" cy="6858000"/>
   <p:notesSz cx="6858000" cy="9144000"/>
@@ -271,7 +275,7 @@
           <a:p>
             <a:fld id="{47FBABC7-F946-4B58-B56F-B35BD43FEC76}" type="datetimeFigureOut">
               <a:rPr lang="ko-KR" altLang="en-US" smtClean="0"/>
-              <a:t>2014-12-15</a:t>
+              <a:t>2014-12-23</a:t>
             </a:fld>
             <a:endParaRPr lang="ko-KR" altLang="en-US"/>
           </a:p>
@@ -524,7 +528,7 @@
           <a:p>
             <a:fld id="{47FBABC7-F946-4B58-B56F-B35BD43FEC76}" type="datetimeFigureOut">
               <a:rPr lang="ko-KR" altLang="en-US" smtClean="0"/>
-              <a:t>2014-12-15</a:t>
+              <a:t>2014-12-23</a:t>
             </a:fld>
             <a:endParaRPr lang="ko-KR" altLang="en-US"/>
           </a:p>
@@ -694,7 +698,7 @@
           <a:p>
             <a:fld id="{47FBABC7-F946-4B58-B56F-B35BD43FEC76}" type="datetimeFigureOut">
               <a:rPr lang="ko-KR" altLang="en-US" smtClean="0"/>
-              <a:t>2014-12-15</a:t>
+              <a:t>2014-12-23</a:t>
             </a:fld>
             <a:endParaRPr lang="ko-KR" altLang="en-US"/>
           </a:p>
@@ -874,7 +878,7 @@
           <a:p>
             <a:fld id="{47FBABC7-F946-4B58-B56F-B35BD43FEC76}" type="datetimeFigureOut">
               <a:rPr lang="ko-KR" altLang="en-US" smtClean="0"/>
-              <a:t>2014-12-15</a:t>
+              <a:t>2014-12-23</a:t>
             </a:fld>
             <a:endParaRPr lang="ko-KR" altLang="en-US"/>
           </a:p>
@@ -1044,7 +1048,7 @@
           <a:p>
             <a:fld id="{47FBABC7-F946-4B58-B56F-B35BD43FEC76}" type="datetimeFigureOut">
               <a:rPr lang="ko-KR" altLang="en-US" smtClean="0"/>
-              <a:t>2014-12-15</a:t>
+              <a:t>2014-12-23</a:t>
             </a:fld>
             <a:endParaRPr lang="ko-KR" altLang="en-US"/>
           </a:p>
@@ -1173,7 +1177,7 @@
           <a:p>
             <a:fld id="{47FBABC7-F946-4B58-B56F-B35BD43FEC76}" type="datetimeFigureOut">
               <a:rPr lang="ko-KR" altLang="en-US" smtClean="0"/>
-              <a:t>2014-12-15</a:t>
+              <a:t>2014-12-23</a:t>
             </a:fld>
             <a:endParaRPr lang="ko-KR" altLang="en-US"/>
           </a:p>
@@ -1474,7 +1478,7 @@
           <a:p>
             <a:fld id="{47FBABC7-F946-4B58-B56F-B35BD43FEC76}" type="datetimeFigureOut">
               <a:rPr lang="ko-KR" altLang="en-US" smtClean="0"/>
-              <a:t>2014-12-15</a:t>
+              <a:t>2014-12-23</a:t>
             </a:fld>
             <a:endParaRPr lang="ko-KR" altLang="en-US"/>
           </a:p>
@@ -1706,7 +1710,7 @@
           <a:p>
             <a:fld id="{47FBABC7-F946-4B58-B56F-B35BD43FEC76}" type="datetimeFigureOut">
               <a:rPr lang="ko-KR" altLang="en-US" smtClean="0"/>
-              <a:t>2014-12-15</a:t>
+              <a:t>2014-12-23</a:t>
             </a:fld>
             <a:endParaRPr lang="ko-KR" altLang="en-US"/>
           </a:p>
@@ -2073,7 +2077,7 @@
           <a:p>
             <a:fld id="{47FBABC7-F946-4B58-B56F-B35BD43FEC76}" type="datetimeFigureOut">
               <a:rPr lang="ko-KR" altLang="en-US" smtClean="0"/>
-              <a:t>2014-12-15</a:t>
+              <a:t>2014-12-23</a:t>
             </a:fld>
             <a:endParaRPr lang="ko-KR" altLang="en-US"/>
           </a:p>
@@ -2191,7 +2195,7 @@
           <a:p>
             <a:fld id="{47FBABC7-F946-4B58-B56F-B35BD43FEC76}" type="datetimeFigureOut">
               <a:rPr lang="ko-KR" altLang="en-US" smtClean="0"/>
-              <a:t>2014-12-15</a:t>
+              <a:t>2014-12-23</a:t>
             </a:fld>
             <a:endParaRPr lang="ko-KR" altLang="en-US"/>
           </a:p>
@@ -2286,7 +2290,7 @@
           <a:p>
             <a:fld id="{47FBABC7-F946-4B58-B56F-B35BD43FEC76}" type="datetimeFigureOut">
               <a:rPr lang="ko-KR" altLang="en-US" smtClean="0"/>
-              <a:t>2014-12-15</a:t>
+              <a:t>2014-12-23</a:t>
             </a:fld>
             <a:endParaRPr lang="ko-KR" altLang="en-US"/>
           </a:p>
@@ -2563,7 +2567,7 @@
           <a:p>
             <a:fld id="{47FBABC7-F946-4B58-B56F-B35BD43FEC76}" type="datetimeFigureOut">
               <a:rPr lang="ko-KR" altLang="en-US" smtClean="0"/>
-              <a:t>2014-12-15</a:t>
+              <a:t>2014-12-23</a:t>
             </a:fld>
             <a:endParaRPr lang="ko-KR" altLang="en-US"/>
           </a:p>
@@ -2776,7 +2780,7 @@
           <a:p>
             <a:fld id="{47FBABC7-F946-4B58-B56F-B35BD43FEC76}" type="datetimeFigureOut">
               <a:rPr lang="ko-KR" altLang="en-US" smtClean="0"/>
-              <a:t>2014-12-15</a:t>
+              <a:t>2014-12-23</a:t>
             </a:fld>
             <a:endParaRPr lang="ko-KR" altLang="en-US"/>
           </a:p>
@@ -5369,6 +5373,333 @@
 </p:sld>
 </file>
 
+<file path=ppt/slides/slide30.xml><?xml version="1.0" encoding="utf-8"?>
+<p:sld xmlns:a="http://schemas.openxmlformats.org/drawingml/2006/main" xmlns:r="http://schemas.openxmlformats.org/officeDocument/2006/relationships" xmlns:p="http://schemas.openxmlformats.org/presentationml/2006/main">
+  <p:cSld>
+    <p:spTree>
+      <p:nvGrpSpPr>
+        <p:cNvPr id="1" name=""/>
+        <p:cNvGrpSpPr/>
+        <p:nvPr/>
+      </p:nvGrpSpPr>
+      <p:grpSpPr>
+        <a:xfrm>
+          <a:off x="0" y="0"/>
+          <a:ext cx="0" cy="0"/>
+          <a:chOff x="0" y="0"/>
+          <a:chExt cx="0" cy="0"/>
+        </a:xfrm>
+      </p:grpSpPr>
+      <p:sp>
+        <p:nvSpPr>
+          <p:cNvPr id="2" name="제목 1"/>
+          <p:cNvSpPr>
+            <a:spLocks noGrp="1"/>
+          </p:cNvSpPr>
+          <p:nvPr>
+            <p:ph type="title"/>
+          </p:nvPr>
+        </p:nvSpPr>
+        <p:spPr/>
+        <p:txBody>
+          <a:bodyPr/>
+          <a:lstStyle/>
+          <a:p>
+            <a:r>
+              <a:rPr lang="en-US" altLang="ko-KR" dirty="0"/>
+              <a:t>by Gabriela </a:t>
+            </a:r>
+            <a:r>
+              <a:rPr lang="en-US" altLang="ko-KR" dirty="0" err="1"/>
+              <a:t>Muñiz</a:t>
+            </a:r>
+            <a:r>
+              <a:rPr lang="en-US" altLang="ko-KR" dirty="0"/>
+              <a:t/>
+            </a:r>
+            <a:br>
+              <a:rPr lang="en-US" altLang="ko-KR" dirty="0"/>
+            </a:br>
+            <a:endParaRPr lang="ko-KR" altLang="en-US" dirty="0"/>
+          </a:p>
+        </p:txBody>
+      </p:sp>
+      <p:pic>
+        <p:nvPicPr>
+          <p:cNvPr id="4" name="그림 개체 틀 3"/>
+          <p:cNvPicPr>
+            <a:picLocks noGrp="1" noChangeAspect="1"/>
+          </p:cNvPicPr>
+          <p:nvPr>
+            <p:ph type="pic" sz="quarter" idx="13"/>
+          </p:nvPr>
+        </p:nvPicPr>
+        <p:blipFill>
+          <a:blip r:embed="rId2" cstate="print">
+            <a:extLst>
+              <a:ext uri="{28A0092B-C50C-407E-A947-70E740481C1C}">
+                <a14:useLocalDpi xmlns:a14="http://schemas.microsoft.com/office/drawing/2010/main" val="0"/>
+              </a:ext>
+            </a:extLst>
+          </a:blip>
+          <a:srcRect/>
+          <a:stretch>
+            <a:fillRect/>
+          </a:stretch>
+        </p:blipFill>
+        <p:spPr/>
+      </p:pic>
+    </p:spTree>
+    <p:extLst>
+      <p:ext uri="{BB962C8B-B14F-4D97-AF65-F5344CB8AC3E}">
+        <p14:creationId xmlns:p14="http://schemas.microsoft.com/office/powerpoint/2010/main" val="1038069335"/>
+      </p:ext>
+    </p:extLst>
+  </p:cSld>
+  <p:clrMapOvr>
+    <a:masterClrMapping/>
+  </p:clrMapOvr>
+</p:sld>
+</file>
+
+<file path=ppt/slides/slide31.xml><?xml version="1.0" encoding="utf-8"?>
+<p:sld xmlns:a="http://schemas.openxmlformats.org/drawingml/2006/main" xmlns:r="http://schemas.openxmlformats.org/officeDocument/2006/relationships" xmlns:p="http://schemas.openxmlformats.org/presentationml/2006/main">
+  <p:cSld>
+    <p:spTree>
+      <p:nvGrpSpPr>
+        <p:cNvPr id="1" name=""/>
+        <p:cNvGrpSpPr/>
+        <p:nvPr/>
+      </p:nvGrpSpPr>
+      <p:grpSpPr>
+        <a:xfrm>
+          <a:off x="0" y="0"/>
+          <a:ext cx="0" cy="0"/>
+          <a:chOff x="0" y="0"/>
+          <a:chExt cx="0" cy="0"/>
+        </a:xfrm>
+      </p:grpSpPr>
+      <p:sp>
+        <p:nvSpPr>
+          <p:cNvPr id="2" name="제목 1"/>
+          <p:cNvSpPr>
+            <a:spLocks noGrp="1"/>
+          </p:cNvSpPr>
+          <p:nvPr>
+            <p:ph type="title"/>
+          </p:nvPr>
+        </p:nvSpPr>
+        <p:spPr/>
+        <p:txBody>
+          <a:bodyPr/>
+          <a:lstStyle/>
+          <a:p>
+            <a:r>
+              <a:rPr lang="en-US" altLang="ko-KR" dirty="0"/>
+              <a:t>icon by Eric M. Ellis</a:t>
+            </a:r>
+            <a:br>
+              <a:rPr lang="en-US" altLang="ko-KR" dirty="0"/>
+            </a:br>
+            <a:endParaRPr lang="ko-KR" altLang="en-US" dirty="0"/>
+          </a:p>
+        </p:txBody>
+      </p:sp>
+      <p:pic>
+        <p:nvPicPr>
+          <p:cNvPr id="4" name="그림 개체 틀 3"/>
+          <p:cNvPicPr>
+            <a:picLocks noGrp="1" noChangeAspect="1"/>
+          </p:cNvPicPr>
+          <p:nvPr>
+            <p:ph type="pic" sz="quarter" idx="13"/>
+          </p:nvPr>
+        </p:nvPicPr>
+        <p:blipFill>
+          <a:blip r:embed="rId2" cstate="print">
+            <a:extLst>
+              <a:ext uri="{28A0092B-C50C-407E-A947-70E740481C1C}">
+                <a14:useLocalDpi xmlns:a14="http://schemas.microsoft.com/office/drawing/2010/main" val="0"/>
+              </a:ext>
+            </a:extLst>
+          </a:blip>
+          <a:srcRect/>
+          <a:stretch>
+            <a:fillRect/>
+          </a:stretch>
+        </p:blipFill>
+        <p:spPr/>
+      </p:pic>
+    </p:spTree>
+    <p:extLst>
+      <p:ext uri="{BB962C8B-B14F-4D97-AF65-F5344CB8AC3E}">
+        <p14:creationId xmlns:p14="http://schemas.microsoft.com/office/powerpoint/2010/main" val="3714138876"/>
+      </p:ext>
+    </p:extLst>
+  </p:cSld>
+  <p:clrMapOvr>
+    <a:masterClrMapping/>
+  </p:clrMapOvr>
+</p:sld>
+</file>
+
+<file path=ppt/slides/slide32.xml><?xml version="1.0" encoding="utf-8"?>
+<p:sld xmlns:a="http://schemas.openxmlformats.org/drawingml/2006/main" xmlns:r="http://schemas.openxmlformats.org/officeDocument/2006/relationships" xmlns:p="http://schemas.openxmlformats.org/presentationml/2006/main">
+  <p:cSld>
+    <p:spTree>
+      <p:nvGrpSpPr>
+        <p:cNvPr id="1" name=""/>
+        <p:cNvGrpSpPr/>
+        <p:nvPr/>
+      </p:nvGrpSpPr>
+      <p:grpSpPr>
+        <a:xfrm>
+          <a:off x="0" y="0"/>
+          <a:ext cx="0" cy="0"/>
+          <a:chOff x="0" y="0"/>
+          <a:chExt cx="0" cy="0"/>
+        </a:xfrm>
+      </p:grpSpPr>
+      <p:sp>
+        <p:nvSpPr>
+          <p:cNvPr id="2" name="제목 1"/>
+          <p:cNvSpPr>
+            <a:spLocks noGrp="1"/>
+          </p:cNvSpPr>
+          <p:nvPr>
+            <p:ph type="title"/>
+          </p:nvPr>
+        </p:nvSpPr>
+        <p:spPr/>
+        <p:txBody>
+          <a:bodyPr/>
+          <a:lstStyle/>
+          <a:p>
+            <a:r>
+              <a:rPr lang="en-US" altLang="ko-KR" dirty="0"/>
+              <a:t>by </a:t>
+            </a:r>
+            <a:r>
+              <a:rPr lang="en-US" altLang="ko-KR" dirty="0" err="1"/>
+              <a:t>shaheen</a:t>
+            </a:r>
+            <a:r>
+              <a:rPr lang="en-US" altLang="ko-KR" dirty="0"/>
+              <a:t/>
+            </a:r>
+            <a:br>
+              <a:rPr lang="en-US" altLang="ko-KR" dirty="0"/>
+            </a:br>
+            <a:endParaRPr lang="ko-KR" altLang="en-US" dirty="0"/>
+          </a:p>
+        </p:txBody>
+      </p:sp>
+      <p:pic>
+        <p:nvPicPr>
+          <p:cNvPr id="4" name="그림 개체 틀 3"/>
+          <p:cNvPicPr>
+            <a:picLocks noGrp="1" noChangeAspect="1"/>
+          </p:cNvPicPr>
+          <p:nvPr>
+            <p:ph type="pic" sz="quarter" idx="13"/>
+          </p:nvPr>
+        </p:nvPicPr>
+        <p:blipFill>
+          <a:blip r:embed="rId2" cstate="print">
+            <a:extLst>
+              <a:ext uri="{28A0092B-C50C-407E-A947-70E740481C1C}">
+                <a14:useLocalDpi xmlns:a14="http://schemas.microsoft.com/office/drawing/2010/main" val="0"/>
+              </a:ext>
+            </a:extLst>
+          </a:blip>
+          <a:srcRect/>
+          <a:stretch>
+            <a:fillRect/>
+          </a:stretch>
+        </p:blipFill>
+        <p:spPr/>
+      </p:pic>
+    </p:spTree>
+    <p:extLst>
+      <p:ext uri="{BB962C8B-B14F-4D97-AF65-F5344CB8AC3E}">
+        <p14:creationId xmlns:p14="http://schemas.microsoft.com/office/powerpoint/2010/main" val="631664797"/>
+      </p:ext>
+    </p:extLst>
+  </p:cSld>
+  <p:clrMapOvr>
+    <a:masterClrMapping/>
+  </p:clrMapOvr>
+  <p:timing>
+    <p:tnLst>
+      <p:par>
+        <p:cTn id="1" dur="indefinite" restart="never" nodeType="tmRoot"/>
+      </p:par>
+    </p:tnLst>
+  </p:timing>
+</p:sld>
+</file>
+
+<file path=ppt/slides/slide33.xml><?xml version="1.0" encoding="utf-8"?>
+<p:sld xmlns:a="http://schemas.openxmlformats.org/drawingml/2006/main" xmlns:r="http://schemas.openxmlformats.org/officeDocument/2006/relationships" xmlns:p="http://schemas.openxmlformats.org/presentationml/2006/main">
+  <p:cSld>
+    <p:spTree>
+      <p:nvGrpSpPr>
+        <p:cNvPr id="1" name=""/>
+        <p:cNvGrpSpPr/>
+        <p:nvPr/>
+      </p:nvGrpSpPr>
+      <p:grpSpPr>
+        <a:xfrm>
+          <a:off x="0" y="0"/>
+          <a:ext cx="0" cy="0"/>
+          <a:chOff x="0" y="0"/>
+          <a:chExt cx="0" cy="0"/>
+        </a:xfrm>
+      </p:grpSpPr>
+      <p:sp>
+        <p:nvSpPr>
+          <p:cNvPr id="2" name="제목 1"/>
+          <p:cNvSpPr>
+            <a:spLocks noGrp="1"/>
+          </p:cNvSpPr>
+          <p:nvPr>
+            <p:ph type="title"/>
+          </p:nvPr>
+        </p:nvSpPr>
+        <p:spPr/>
+        <p:txBody>
+          <a:bodyPr/>
+          <a:lstStyle/>
+          <a:p>
+            <a:endParaRPr lang="ko-KR" altLang="en-US"/>
+          </a:p>
+        </p:txBody>
+      </p:sp>
+      <p:sp>
+        <p:nvSpPr>
+          <p:cNvPr id="3" name="그림 개체 틀 2"/>
+          <p:cNvSpPr>
+            <a:spLocks noGrp="1"/>
+          </p:cNvSpPr>
+          <p:nvPr>
+            <p:ph type="pic" sz="quarter" idx="13"/>
+          </p:nvPr>
+        </p:nvSpPr>
+        <p:spPr/>
+      </p:sp>
+    </p:spTree>
+    <p:extLst>
+      <p:ext uri="{BB962C8B-B14F-4D97-AF65-F5344CB8AC3E}">
+        <p14:creationId xmlns:p14="http://schemas.microsoft.com/office/powerpoint/2010/main" val="3853928791"/>
+      </p:ext>
+    </p:extLst>
+  </p:cSld>
+  <p:clrMapOvr>
+    <a:masterClrMapping/>
+  </p:clrMapOvr>
+</p:sld>
+</file>
+
 <file path=ppt/slides/slide4.xml><?xml version="1.0" encoding="utf-8"?>
 <p:sld xmlns:a="http://schemas.openxmlformats.org/drawingml/2006/main" xmlns:r="http://schemas.openxmlformats.org/officeDocument/2006/relationships" xmlns:p="http://schemas.openxmlformats.org/presentationml/2006/main">
   <p:cSld>

</xml_diff>